<commit_message>
revise research and videos
</commit_message>
<xml_diff>
--- a/images/researchpic/drawing.pptx
+++ b/images/researchpic/drawing.pptx
@@ -6,6 +6,8 @@
   </p:sldMasterIdLst>
   <p:sldIdLst>
     <p:sldId id="256" r:id="rId2"/>
+    <p:sldId id="257" r:id="rId3"/>
+    <p:sldId id="258" r:id="rId4"/>
   </p:sldIdLst>
   <p:sldSz cx="9144000" cy="6858000" type="screen4x3"/>
   <p:notesSz cx="6858000" cy="9144000"/>
@@ -3029,6 +3031,1884 @@
 </p:sld>
 </file>
 
+<file path=ppt/slides/slide2.xml><?xml version="1.0" encoding="utf-8"?>
+<p:sld xmlns:a="http://schemas.openxmlformats.org/drawingml/2006/main" xmlns:r="http://schemas.openxmlformats.org/officeDocument/2006/relationships" xmlns:p="http://schemas.openxmlformats.org/presentationml/2006/main">
+  <p:cSld>
+    <p:spTree>
+      <p:nvGrpSpPr>
+        <p:cNvPr id="1" name=""/>
+        <p:cNvGrpSpPr/>
+        <p:nvPr/>
+      </p:nvGrpSpPr>
+      <p:grpSpPr>
+        <a:xfrm>
+          <a:off x="0" y="0"/>
+          <a:ext cx="0" cy="0"/>
+          <a:chOff x="0" y="0"/>
+          <a:chExt cx="0" cy="0"/>
+        </a:xfrm>
+      </p:grpSpPr>
+      <p:pic>
+        <p:nvPicPr>
+          <p:cNvPr id="4" name="图片 39">
+            <a:extLst>
+              <a:ext uri="{FF2B5EF4-FFF2-40B4-BE49-F238E27FC236}">
+                <a16:creationId xmlns:a16="http://schemas.microsoft.com/office/drawing/2014/main" id="{7892E19A-D695-6B40-8CC6-C3C13259A19E}"/>
+              </a:ext>
+            </a:extLst>
+          </p:cNvPr>
+          <p:cNvPicPr/>
+          <p:nvPr/>
+        </p:nvPicPr>
+        <p:blipFill>
+          <a:blip r:embed="rId2" cstate="print">
+            <a:extLst>
+              <a:ext uri="{28A0092B-C50C-407E-A947-70E740481C1C}">
+                <a14:useLocalDpi xmlns:a14="http://schemas.microsoft.com/office/drawing/2010/main" val="0"/>
+              </a:ext>
+            </a:extLst>
+          </a:blip>
+          <a:srcRect/>
+          <a:stretch>
+            <a:fillRect/>
+          </a:stretch>
+        </p:blipFill>
+        <p:spPr bwMode="auto">
+          <a:xfrm>
+            <a:off x="610519" y="1950179"/>
+            <a:ext cx="7292340" cy="3881704"/>
+          </a:xfrm>
+          <a:prstGeom prst="rect">
+            <a:avLst/>
+          </a:prstGeom>
+          <a:noFill/>
+          <a:ln>
+            <a:noFill/>
+          </a:ln>
+        </p:spPr>
+      </p:pic>
+      <p:sp>
+        <p:nvSpPr>
+          <p:cNvPr id="5" name="Rectangle 4">
+            <a:extLst>
+              <a:ext uri="{FF2B5EF4-FFF2-40B4-BE49-F238E27FC236}">
+                <a16:creationId xmlns:a16="http://schemas.microsoft.com/office/drawing/2014/main" id="{702D4784-0DD6-D346-9E54-04C36ABA9B5B}"/>
+              </a:ext>
+            </a:extLst>
+          </p:cNvPr>
+          <p:cNvSpPr/>
+          <p:nvPr/>
+        </p:nvSpPr>
+        <p:spPr>
+          <a:xfrm>
+            <a:off x="595529" y="2428407"/>
+            <a:ext cx="7371743" cy="2263514"/>
+          </a:xfrm>
+          <a:prstGeom prst="rect">
+            <a:avLst/>
+          </a:prstGeom>
+          <a:solidFill>
+            <a:schemeClr val="bg1">
+              <a:alpha val="48000"/>
+            </a:schemeClr>
+          </a:solidFill>
+          <a:ln>
+            <a:noFill/>
+          </a:ln>
+        </p:spPr>
+        <p:style>
+          <a:lnRef idx="2">
+            <a:schemeClr val="accent1">
+              <a:shade val="50000"/>
+            </a:schemeClr>
+          </a:lnRef>
+          <a:fillRef idx="1">
+            <a:schemeClr val="accent1"/>
+          </a:fillRef>
+          <a:effectRef idx="0">
+            <a:schemeClr val="accent1"/>
+          </a:effectRef>
+          <a:fontRef idx="minor">
+            <a:schemeClr val="lt1"/>
+          </a:fontRef>
+        </p:style>
+        <p:txBody>
+          <a:bodyPr rtlCol="0" anchor="ctr"/>
+          <a:lstStyle/>
+          <a:p>
+            <a:pPr algn="ctr"/>
+            <a:endParaRPr lang="en-CN" dirty="0"/>
+          </a:p>
+        </p:txBody>
+      </p:sp>
+      <p:pic>
+        <p:nvPicPr>
+          <p:cNvPr id="2" name="图片 41">
+            <a:extLst>
+              <a:ext uri="{FF2B5EF4-FFF2-40B4-BE49-F238E27FC236}">
+                <a16:creationId xmlns:a16="http://schemas.microsoft.com/office/drawing/2014/main" id="{6BAF5A07-7BC0-1149-99BD-0082222CB379}"/>
+              </a:ext>
+            </a:extLst>
+          </p:cNvPr>
+          <p:cNvPicPr>
+            <a:picLocks noChangeAspect="1"/>
+          </p:cNvPicPr>
+          <p:nvPr/>
+        </p:nvPicPr>
+        <p:blipFill rotWithShape="1">
+          <a:blip r:embed="rId3">
+            <a:extLst>
+              <a:ext uri="{BEBA8EAE-BF5A-486C-A8C5-ECC9F3942E4B}">
+                <a14:imgProps xmlns:a14="http://schemas.microsoft.com/office/drawing/2010/main">
+                  <a14:imgLayer r:embed="rId4">
+                    <a14:imgEffect>
+                      <a14:sharpenSoften amount="50000"/>
+                    </a14:imgEffect>
+                    <a14:imgEffect>
+                      <a14:brightnessContrast bright="20000" contrast="40000"/>
+                    </a14:imgEffect>
+                  </a14:imgLayer>
+                </a14:imgProps>
+              </a:ext>
+              <a:ext uri="{28A0092B-C50C-407E-A947-70E740481C1C}">
+                <a14:useLocalDpi xmlns:a14="http://schemas.microsoft.com/office/drawing/2010/main" val="0"/>
+              </a:ext>
+            </a:extLst>
+          </a:blip>
+          <a:srcRect r="4727"/>
+          <a:stretch/>
+        </p:blipFill>
+        <p:spPr>
+          <a:xfrm>
+            <a:off x="5695124" y="2685526"/>
+            <a:ext cx="2226023" cy="1752355"/>
+          </a:xfrm>
+          <a:prstGeom prst="rect">
+            <a:avLst/>
+          </a:prstGeom>
+        </p:spPr>
+      </p:pic>
+      <p:pic>
+        <p:nvPicPr>
+          <p:cNvPr id="3" name="图片 40">
+            <a:extLst>
+              <a:ext uri="{FF2B5EF4-FFF2-40B4-BE49-F238E27FC236}">
+                <a16:creationId xmlns:a16="http://schemas.microsoft.com/office/drawing/2014/main" id="{6F368BB7-D058-C043-A03F-F6176137FD02}"/>
+              </a:ext>
+            </a:extLst>
+          </p:cNvPr>
+          <p:cNvPicPr>
+            <a:picLocks noChangeAspect="1"/>
+          </p:cNvPicPr>
+          <p:nvPr/>
+        </p:nvPicPr>
+        <p:blipFill rotWithShape="1">
+          <a:blip r:embed="rId5">
+            <a:extLst>
+              <a:ext uri="{BEBA8EAE-BF5A-486C-A8C5-ECC9F3942E4B}">
+                <a14:imgProps xmlns:a14="http://schemas.microsoft.com/office/drawing/2010/main">
+                  <a14:imgLayer r:embed="rId6">
+                    <a14:imgEffect>
+                      <a14:brightnessContrast bright="20000" contrast="20000"/>
+                    </a14:imgEffect>
+                  </a14:imgLayer>
+                </a14:imgProps>
+              </a:ext>
+            </a:extLst>
+          </a:blip>
+          <a:srcRect l="4626" t="813" b="21862"/>
+          <a:stretch/>
+        </p:blipFill>
+        <p:spPr>
+          <a:xfrm>
+            <a:off x="748169" y="2562114"/>
+            <a:ext cx="4344738" cy="1996100"/>
+          </a:xfrm>
+          <a:prstGeom prst="rect">
+            <a:avLst/>
+          </a:prstGeom>
+        </p:spPr>
+      </p:pic>
+      <p:cxnSp>
+        <p:nvCxnSpPr>
+          <p:cNvPr id="7" name="Straight Connector 6">
+            <a:extLst>
+              <a:ext uri="{FF2B5EF4-FFF2-40B4-BE49-F238E27FC236}">
+                <a16:creationId xmlns:a16="http://schemas.microsoft.com/office/drawing/2014/main" id="{DF3CB253-6766-4449-9C51-D44408F15041}"/>
+              </a:ext>
+            </a:extLst>
+          </p:cNvPr>
+          <p:cNvCxnSpPr>
+            <a:cxnSpLocks/>
+          </p:cNvCxnSpPr>
+          <p:nvPr/>
+        </p:nvCxnSpPr>
+        <p:spPr>
+          <a:xfrm flipV="1">
+            <a:off x="1526650" y="2737144"/>
+            <a:ext cx="508041" cy="85569"/>
+          </a:xfrm>
+          <a:prstGeom prst="line">
+            <a:avLst/>
+          </a:prstGeom>
+          <a:ln w="15875">
+            <a:prstDash val="dash"/>
+          </a:ln>
+        </p:spPr>
+        <p:style>
+          <a:lnRef idx="1">
+            <a:schemeClr val="accent1"/>
+          </a:lnRef>
+          <a:fillRef idx="0">
+            <a:schemeClr val="accent1"/>
+          </a:fillRef>
+          <a:effectRef idx="0">
+            <a:schemeClr val="accent1"/>
+          </a:effectRef>
+          <a:fontRef idx="minor">
+            <a:schemeClr val="tx1"/>
+          </a:fontRef>
+        </p:style>
+      </p:cxnSp>
+      <p:cxnSp>
+        <p:nvCxnSpPr>
+          <p:cNvPr id="9" name="Straight Connector 8">
+            <a:extLst>
+              <a:ext uri="{FF2B5EF4-FFF2-40B4-BE49-F238E27FC236}">
+                <a16:creationId xmlns:a16="http://schemas.microsoft.com/office/drawing/2014/main" id="{8F2186DD-F465-7C4C-A56E-EBC8E8F4700E}"/>
+              </a:ext>
+            </a:extLst>
+          </p:cNvPr>
+          <p:cNvCxnSpPr>
+            <a:cxnSpLocks/>
+          </p:cNvCxnSpPr>
+          <p:nvPr/>
+        </p:nvCxnSpPr>
+        <p:spPr>
+          <a:xfrm flipV="1">
+            <a:off x="2284614" y="2706864"/>
+            <a:ext cx="552782" cy="1"/>
+          </a:xfrm>
+          <a:prstGeom prst="line">
+            <a:avLst/>
+          </a:prstGeom>
+          <a:ln w="15875">
+            <a:prstDash val="dash"/>
+          </a:ln>
+        </p:spPr>
+        <p:style>
+          <a:lnRef idx="1">
+            <a:schemeClr val="accent1"/>
+          </a:lnRef>
+          <a:fillRef idx="0">
+            <a:schemeClr val="accent1"/>
+          </a:fillRef>
+          <a:effectRef idx="0">
+            <a:schemeClr val="accent1"/>
+          </a:effectRef>
+          <a:fontRef idx="minor">
+            <a:schemeClr val="tx1"/>
+          </a:fontRef>
+        </p:style>
+      </p:cxnSp>
+      <p:cxnSp>
+        <p:nvCxnSpPr>
+          <p:cNvPr id="11" name="Straight Connector 10">
+            <a:extLst>
+              <a:ext uri="{FF2B5EF4-FFF2-40B4-BE49-F238E27FC236}">
+                <a16:creationId xmlns:a16="http://schemas.microsoft.com/office/drawing/2014/main" id="{5484751D-51AD-9B4D-A7B4-F0DAC15F1ACE}"/>
+              </a:ext>
+            </a:extLst>
+          </p:cNvPr>
+          <p:cNvCxnSpPr>
+            <a:cxnSpLocks/>
+          </p:cNvCxnSpPr>
+          <p:nvPr/>
+        </p:nvCxnSpPr>
+        <p:spPr>
+          <a:xfrm>
+            <a:off x="3136359" y="2737145"/>
+            <a:ext cx="715021" cy="85568"/>
+          </a:xfrm>
+          <a:prstGeom prst="line">
+            <a:avLst/>
+          </a:prstGeom>
+          <a:ln w="15875">
+            <a:prstDash val="dash"/>
+          </a:ln>
+        </p:spPr>
+        <p:style>
+          <a:lnRef idx="1">
+            <a:schemeClr val="accent1"/>
+          </a:lnRef>
+          <a:fillRef idx="0">
+            <a:schemeClr val="accent1"/>
+          </a:fillRef>
+          <a:effectRef idx="0">
+            <a:schemeClr val="accent1"/>
+          </a:effectRef>
+          <a:fontRef idx="minor">
+            <a:schemeClr val="tx1"/>
+          </a:fontRef>
+        </p:style>
+      </p:cxnSp>
+      <p:cxnSp>
+        <p:nvCxnSpPr>
+          <p:cNvPr id="13" name="Straight Connector 12">
+            <a:extLst>
+              <a:ext uri="{FF2B5EF4-FFF2-40B4-BE49-F238E27FC236}">
+                <a16:creationId xmlns:a16="http://schemas.microsoft.com/office/drawing/2014/main" id="{FF744BE4-982D-6345-9F00-17AB845C24C0}"/>
+              </a:ext>
+            </a:extLst>
+          </p:cNvPr>
+          <p:cNvCxnSpPr>
+            <a:cxnSpLocks/>
+          </p:cNvCxnSpPr>
+          <p:nvPr/>
+        </p:nvCxnSpPr>
+        <p:spPr>
+          <a:xfrm>
+            <a:off x="4142050" y="2918813"/>
+            <a:ext cx="139350" cy="320949"/>
+          </a:xfrm>
+          <a:prstGeom prst="line">
+            <a:avLst/>
+          </a:prstGeom>
+          <a:ln w="15875">
+            <a:prstDash val="dash"/>
+          </a:ln>
+        </p:spPr>
+        <p:style>
+          <a:lnRef idx="1">
+            <a:schemeClr val="accent1"/>
+          </a:lnRef>
+          <a:fillRef idx="0">
+            <a:schemeClr val="accent1"/>
+          </a:fillRef>
+          <a:effectRef idx="0">
+            <a:schemeClr val="accent1"/>
+          </a:effectRef>
+          <a:fontRef idx="minor">
+            <a:schemeClr val="tx1"/>
+          </a:fontRef>
+        </p:style>
+      </p:cxnSp>
+      <p:cxnSp>
+        <p:nvCxnSpPr>
+          <p:cNvPr id="16" name="Straight Connector 15">
+            <a:extLst>
+              <a:ext uri="{FF2B5EF4-FFF2-40B4-BE49-F238E27FC236}">
+                <a16:creationId xmlns:a16="http://schemas.microsoft.com/office/drawing/2014/main" id="{8BBDC6D0-8B2C-5B49-A3B9-4B11A46CB06A}"/>
+              </a:ext>
+            </a:extLst>
+          </p:cNvPr>
+          <p:cNvCxnSpPr>
+            <a:cxnSpLocks/>
+          </p:cNvCxnSpPr>
+          <p:nvPr/>
+        </p:nvCxnSpPr>
+        <p:spPr>
+          <a:xfrm flipH="1">
+            <a:off x="1332098" y="2986434"/>
+            <a:ext cx="22663" cy="253328"/>
+          </a:xfrm>
+          <a:prstGeom prst="line">
+            <a:avLst/>
+          </a:prstGeom>
+          <a:ln w="15875">
+            <a:prstDash val="dash"/>
+          </a:ln>
+        </p:spPr>
+        <p:style>
+          <a:lnRef idx="1">
+            <a:schemeClr val="accent1"/>
+          </a:lnRef>
+          <a:fillRef idx="0">
+            <a:schemeClr val="accent1"/>
+          </a:fillRef>
+          <a:effectRef idx="0">
+            <a:schemeClr val="accent1"/>
+          </a:effectRef>
+          <a:fontRef idx="minor">
+            <a:schemeClr val="tx1"/>
+          </a:fontRef>
+        </p:style>
+      </p:cxnSp>
+      <p:cxnSp>
+        <p:nvCxnSpPr>
+          <p:cNvPr id="18" name="Straight Connector 17">
+            <a:extLst>
+              <a:ext uri="{FF2B5EF4-FFF2-40B4-BE49-F238E27FC236}">
+                <a16:creationId xmlns:a16="http://schemas.microsoft.com/office/drawing/2014/main" id="{AB4C7C1A-5A5D-1C4C-A22E-2FD7EEEFAFA4}"/>
+              </a:ext>
+            </a:extLst>
+          </p:cNvPr>
+          <p:cNvCxnSpPr>
+            <a:cxnSpLocks/>
+          </p:cNvCxnSpPr>
+          <p:nvPr/>
+        </p:nvCxnSpPr>
+        <p:spPr>
+          <a:xfrm>
+            <a:off x="2229611" y="2822713"/>
+            <a:ext cx="392476" cy="362380"/>
+          </a:xfrm>
+          <a:prstGeom prst="line">
+            <a:avLst/>
+          </a:prstGeom>
+          <a:ln w="15875">
+            <a:prstDash val="dash"/>
+          </a:ln>
+        </p:spPr>
+        <p:style>
+          <a:lnRef idx="1">
+            <a:schemeClr val="accent1"/>
+          </a:lnRef>
+          <a:fillRef idx="0">
+            <a:schemeClr val="accent1"/>
+          </a:fillRef>
+          <a:effectRef idx="0">
+            <a:schemeClr val="accent1"/>
+          </a:effectRef>
+          <a:fontRef idx="minor">
+            <a:schemeClr val="tx1"/>
+          </a:fontRef>
+        </p:style>
+      </p:cxnSp>
+      <p:cxnSp>
+        <p:nvCxnSpPr>
+          <p:cNvPr id="22" name="Straight Connector 21">
+            <a:extLst>
+              <a:ext uri="{FF2B5EF4-FFF2-40B4-BE49-F238E27FC236}">
+                <a16:creationId xmlns:a16="http://schemas.microsoft.com/office/drawing/2014/main" id="{E13BB502-F3DF-1842-9DAD-2626C2989D0C}"/>
+              </a:ext>
+            </a:extLst>
+          </p:cNvPr>
+          <p:cNvCxnSpPr>
+            <a:cxnSpLocks/>
+          </p:cNvCxnSpPr>
+          <p:nvPr/>
+        </p:nvCxnSpPr>
+        <p:spPr>
+          <a:xfrm flipH="1">
+            <a:off x="2770726" y="2779928"/>
+            <a:ext cx="220755" cy="405165"/>
+          </a:xfrm>
+          <a:prstGeom prst="line">
+            <a:avLst/>
+          </a:prstGeom>
+          <a:ln w="15875">
+            <a:prstDash val="dash"/>
+          </a:ln>
+        </p:spPr>
+        <p:style>
+          <a:lnRef idx="1">
+            <a:schemeClr val="accent1"/>
+          </a:lnRef>
+          <a:fillRef idx="0">
+            <a:schemeClr val="accent1"/>
+          </a:fillRef>
+          <a:effectRef idx="0">
+            <a:schemeClr val="accent1"/>
+          </a:effectRef>
+          <a:fontRef idx="minor">
+            <a:schemeClr val="tx1"/>
+          </a:fontRef>
+        </p:style>
+      </p:cxnSp>
+      <p:cxnSp>
+        <p:nvCxnSpPr>
+          <p:cNvPr id="25" name="Straight Connector 24">
+            <a:extLst>
+              <a:ext uri="{FF2B5EF4-FFF2-40B4-BE49-F238E27FC236}">
+                <a16:creationId xmlns:a16="http://schemas.microsoft.com/office/drawing/2014/main" id="{7A40EAF3-C9D7-844E-A882-9238485233CF}"/>
+              </a:ext>
+            </a:extLst>
+          </p:cNvPr>
+          <p:cNvCxnSpPr>
+            <a:cxnSpLocks/>
+          </p:cNvCxnSpPr>
+          <p:nvPr/>
+        </p:nvCxnSpPr>
+        <p:spPr>
+          <a:xfrm>
+            <a:off x="4379179" y="3452558"/>
+            <a:ext cx="271545" cy="532044"/>
+          </a:xfrm>
+          <a:prstGeom prst="line">
+            <a:avLst/>
+          </a:prstGeom>
+          <a:ln w="15875">
+            <a:prstDash val="dash"/>
+          </a:ln>
+        </p:spPr>
+        <p:style>
+          <a:lnRef idx="1">
+            <a:schemeClr val="accent1"/>
+          </a:lnRef>
+          <a:fillRef idx="0">
+            <a:schemeClr val="accent1"/>
+          </a:fillRef>
+          <a:effectRef idx="0">
+            <a:schemeClr val="accent1"/>
+          </a:effectRef>
+          <a:fontRef idx="minor">
+            <a:schemeClr val="tx1"/>
+          </a:fontRef>
+        </p:style>
+      </p:cxnSp>
+      <p:cxnSp>
+        <p:nvCxnSpPr>
+          <p:cNvPr id="29" name="Straight Connector 28">
+            <a:extLst>
+              <a:ext uri="{FF2B5EF4-FFF2-40B4-BE49-F238E27FC236}">
+                <a16:creationId xmlns:a16="http://schemas.microsoft.com/office/drawing/2014/main" id="{0E540DF2-6111-7547-89AC-2745815532E1}"/>
+              </a:ext>
+            </a:extLst>
+          </p:cNvPr>
+          <p:cNvCxnSpPr>
+            <a:cxnSpLocks/>
+          </p:cNvCxnSpPr>
+          <p:nvPr/>
+        </p:nvCxnSpPr>
+        <p:spPr>
+          <a:xfrm flipH="1">
+            <a:off x="4989838" y="3718580"/>
+            <a:ext cx="908345" cy="375025"/>
+          </a:xfrm>
+          <a:prstGeom prst="line">
+            <a:avLst/>
+          </a:prstGeom>
+          <a:ln w="15875">
+            <a:solidFill>
+              <a:srgbClr val="FF0000"/>
+            </a:solidFill>
+            <a:prstDash val="dash"/>
+          </a:ln>
+        </p:spPr>
+        <p:style>
+          <a:lnRef idx="1">
+            <a:schemeClr val="accent1"/>
+          </a:lnRef>
+          <a:fillRef idx="0">
+            <a:schemeClr val="accent1"/>
+          </a:fillRef>
+          <a:effectRef idx="0">
+            <a:schemeClr val="accent1"/>
+          </a:effectRef>
+          <a:fontRef idx="minor">
+            <a:schemeClr val="tx1"/>
+          </a:fontRef>
+        </p:style>
+      </p:cxnSp>
+    </p:spTree>
+    <p:extLst>
+      <p:ext uri="{BB962C8B-B14F-4D97-AF65-F5344CB8AC3E}">
+        <p14:creationId xmlns:p14="http://schemas.microsoft.com/office/powerpoint/2010/main" val="130834632"/>
+      </p:ext>
+    </p:extLst>
+  </p:cSld>
+  <p:clrMapOvr>
+    <a:masterClrMapping/>
+  </p:clrMapOvr>
+</p:sld>
+</file>
+
+<file path=ppt/slides/slide3.xml><?xml version="1.0" encoding="utf-8"?>
+<p:sld xmlns:a="http://schemas.openxmlformats.org/drawingml/2006/main" xmlns:r="http://schemas.openxmlformats.org/officeDocument/2006/relationships" xmlns:p="http://schemas.openxmlformats.org/presentationml/2006/main">
+  <p:cSld>
+    <p:spTree>
+      <p:nvGrpSpPr>
+        <p:cNvPr id="1" name=""/>
+        <p:cNvGrpSpPr/>
+        <p:nvPr/>
+      </p:nvGrpSpPr>
+      <p:grpSpPr>
+        <a:xfrm>
+          <a:off x="0" y="0"/>
+          <a:ext cx="0" cy="0"/>
+          <a:chOff x="0" y="0"/>
+          <a:chExt cx="0" cy="0"/>
+        </a:xfrm>
+      </p:grpSpPr>
+      <p:pic>
+        <p:nvPicPr>
+          <p:cNvPr id="2" name="图片 7">
+            <a:extLst>
+              <a:ext uri="{FF2B5EF4-FFF2-40B4-BE49-F238E27FC236}">
+                <a16:creationId xmlns:a16="http://schemas.microsoft.com/office/drawing/2014/main" id="{D8474BE9-604C-4B4B-87BF-A2C463821D64}"/>
+              </a:ext>
+            </a:extLst>
+          </p:cNvPr>
+          <p:cNvPicPr>
+            <a:picLocks noChangeAspect="1"/>
+          </p:cNvPicPr>
+          <p:nvPr/>
+        </p:nvPicPr>
+        <p:blipFill>
+          <a:blip r:embed="rId2">
+            <a:extLst>
+              <a:ext uri="{28A0092B-C50C-407E-A947-70E740481C1C}">
+                <a14:useLocalDpi xmlns:a14="http://schemas.microsoft.com/office/drawing/2010/main" val="0"/>
+              </a:ext>
+            </a:extLst>
+          </a:blip>
+          <a:stretch>
+            <a:fillRect/>
+          </a:stretch>
+        </p:blipFill>
+        <p:spPr>
+          <a:xfrm>
+            <a:off x="1070217" y="1365086"/>
+            <a:ext cx="4713300" cy="3322000"/>
+          </a:xfrm>
+          <a:prstGeom prst="rect">
+            <a:avLst/>
+          </a:prstGeom>
+        </p:spPr>
+      </p:pic>
+      <p:sp>
+        <p:nvSpPr>
+          <p:cNvPr id="3" name="矩形 8">
+            <a:extLst>
+              <a:ext uri="{FF2B5EF4-FFF2-40B4-BE49-F238E27FC236}">
+                <a16:creationId xmlns:a16="http://schemas.microsoft.com/office/drawing/2014/main" id="{C43089BA-A6D7-0247-8D26-5D77522EB07A}"/>
+              </a:ext>
+            </a:extLst>
+          </p:cNvPr>
+          <p:cNvSpPr/>
+          <p:nvPr/>
+        </p:nvSpPr>
+        <p:spPr>
+          <a:xfrm>
+            <a:off x="4174848" y="1994535"/>
+            <a:ext cx="415967" cy="444329"/>
+          </a:xfrm>
+          <a:prstGeom prst="rect">
+            <a:avLst/>
+          </a:prstGeom>
+          <a:solidFill>
+            <a:schemeClr val="accent2">
+              <a:alpha val="0"/>
+            </a:schemeClr>
+          </a:solidFill>
+          <a:ln w="25400">
+            <a:solidFill>
+              <a:srgbClr val="0070C0"/>
+            </a:solidFill>
+            <a:prstDash val="sysDash"/>
+          </a:ln>
+        </p:spPr>
+        <p:style>
+          <a:lnRef idx="2">
+            <a:schemeClr val="accent1">
+              <a:shade val="50000"/>
+            </a:schemeClr>
+          </a:lnRef>
+          <a:fillRef idx="1">
+            <a:schemeClr val="accent1"/>
+          </a:fillRef>
+          <a:effectRef idx="0">
+            <a:schemeClr val="accent1"/>
+          </a:effectRef>
+          <a:fontRef idx="minor">
+            <a:schemeClr val="lt1"/>
+          </a:fontRef>
+        </p:style>
+        <p:txBody>
+          <a:bodyPr rtlCol="0" anchor="ctr"/>
+          <a:lstStyle/>
+          <a:p>
+            <a:pPr algn="ctr"/>
+            <a:endParaRPr lang="zh-CN" altLang="en-US"/>
+          </a:p>
+        </p:txBody>
+      </p:sp>
+      <p:sp>
+        <p:nvSpPr>
+          <p:cNvPr id="4" name="矩形 9">
+            <a:extLst>
+              <a:ext uri="{FF2B5EF4-FFF2-40B4-BE49-F238E27FC236}">
+                <a16:creationId xmlns:a16="http://schemas.microsoft.com/office/drawing/2014/main" id="{D481ACE2-5519-884D-893C-56D8538B8F10}"/>
+              </a:ext>
+            </a:extLst>
+          </p:cNvPr>
+          <p:cNvSpPr/>
+          <p:nvPr/>
+        </p:nvSpPr>
+        <p:spPr>
+          <a:xfrm>
+            <a:off x="5485929" y="2800783"/>
+            <a:ext cx="335186" cy="401438"/>
+          </a:xfrm>
+          <a:prstGeom prst="rect">
+            <a:avLst/>
+          </a:prstGeom>
+          <a:solidFill>
+            <a:schemeClr val="accent2">
+              <a:alpha val="0"/>
+            </a:schemeClr>
+          </a:solidFill>
+          <a:ln w="25400">
+            <a:solidFill>
+              <a:srgbClr val="FF0000"/>
+            </a:solidFill>
+            <a:prstDash val="sysDash"/>
+          </a:ln>
+        </p:spPr>
+        <p:style>
+          <a:lnRef idx="2">
+            <a:schemeClr val="accent1">
+              <a:shade val="50000"/>
+            </a:schemeClr>
+          </a:lnRef>
+          <a:fillRef idx="1">
+            <a:schemeClr val="accent1"/>
+          </a:fillRef>
+          <a:effectRef idx="0">
+            <a:schemeClr val="accent1"/>
+          </a:effectRef>
+          <a:fontRef idx="minor">
+            <a:schemeClr val="lt1"/>
+          </a:fontRef>
+        </p:style>
+        <p:txBody>
+          <a:bodyPr rtlCol="0" anchor="ctr"/>
+          <a:lstStyle/>
+          <a:p>
+            <a:pPr algn="ctr"/>
+            <a:endParaRPr lang="zh-CN" altLang="en-US"/>
+          </a:p>
+        </p:txBody>
+      </p:sp>
+      <p:sp>
+        <p:nvSpPr>
+          <p:cNvPr id="6" name="矩形 11">
+            <a:extLst>
+              <a:ext uri="{FF2B5EF4-FFF2-40B4-BE49-F238E27FC236}">
+                <a16:creationId xmlns:a16="http://schemas.microsoft.com/office/drawing/2014/main" id="{FE40317D-019F-C844-BBBE-C7F525D73CEE}"/>
+              </a:ext>
+            </a:extLst>
+          </p:cNvPr>
+          <p:cNvSpPr/>
+          <p:nvPr/>
+        </p:nvSpPr>
+        <p:spPr>
+          <a:xfrm>
+            <a:off x="2313432" y="3310128"/>
+            <a:ext cx="477036" cy="756108"/>
+          </a:xfrm>
+          <a:prstGeom prst="rect">
+            <a:avLst/>
+          </a:prstGeom>
+          <a:solidFill>
+            <a:schemeClr val="accent2">
+              <a:alpha val="0"/>
+            </a:schemeClr>
+          </a:solidFill>
+          <a:ln w="25400">
+            <a:solidFill>
+              <a:srgbClr val="0070C0"/>
+            </a:solidFill>
+            <a:prstDash val="sysDash"/>
+          </a:ln>
+        </p:spPr>
+        <p:style>
+          <a:lnRef idx="2">
+            <a:schemeClr val="accent1">
+              <a:shade val="50000"/>
+            </a:schemeClr>
+          </a:lnRef>
+          <a:fillRef idx="1">
+            <a:schemeClr val="accent1"/>
+          </a:fillRef>
+          <a:effectRef idx="0">
+            <a:schemeClr val="accent1"/>
+          </a:effectRef>
+          <a:fontRef idx="minor">
+            <a:schemeClr val="lt1"/>
+          </a:fontRef>
+        </p:style>
+        <p:txBody>
+          <a:bodyPr rtlCol="0" anchor="ctr"/>
+          <a:lstStyle/>
+          <a:p>
+            <a:pPr algn="ctr"/>
+            <a:endParaRPr lang="zh-CN" altLang="en-US"/>
+          </a:p>
+        </p:txBody>
+      </p:sp>
+      <p:sp>
+        <p:nvSpPr>
+          <p:cNvPr id="7" name="矩形 12">
+            <a:extLst>
+              <a:ext uri="{FF2B5EF4-FFF2-40B4-BE49-F238E27FC236}">
+                <a16:creationId xmlns:a16="http://schemas.microsoft.com/office/drawing/2014/main" id="{33ED54E9-FA5E-B04E-8C11-08DF0A918F16}"/>
+              </a:ext>
+            </a:extLst>
+          </p:cNvPr>
+          <p:cNvSpPr/>
+          <p:nvPr/>
+        </p:nvSpPr>
+        <p:spPr>
+          <a:xfrm>
+            <a:off x="3559979" y="2386086"/>
+            <a:ext cx="524012" cy="649098"/>
+          </a:xfrm>
+          <a:prstGeom prst="rect">
+            <a:avLst/>
+          </a:prstGeom>
+          <a:solidFill>
+            <a:schemeClr val="accent2">
+              <a:alpha val="0"/>
+            </a:schemeClr>
+          </a:solidFill>
+          <a:ln w="25400">
+            <a:solidFill>
+              <a:srgbClr val="0070C0"/>
+            </a:solidFill>
+            <a:prstDash val="sysDash"/>
+          </a:ln>
+        </p:spPr>
+        <p:style>
+          <a:lnRef idx="2">
+            <a:schemeClr val="accent1">
+              <a:shade val="50000"/>
+            </a:schemeClr>
+          </a:lnRef>
+          <a:fillRef idx="1">
+            <a:schemeClr val="accent1"/>
+          </a:fillRef>
+          <a:effectRef idx="0">
+            <a:schemeClr val="accent1"/>
+          </a:effectRef>
+          <a:fontRef idx="minor">
+            <a:schemeClr val="lt1"/>
+          </a:fontRef>
+        </p:style>
+        <p:txBody>
+          <a:bodyPr rtlCol="0" anchor="ctr"/>
+          <a:lstStyle/>
+          <a:p>
+            <a:pPr algn="ctr"/>
+            <a:endParaRPr lang="zh-CN" altLang="en-US"/>
+          </a:p>
+        </p:txBody>
+      </p:sp>
+      <p:sp>
+        <p:nvSpPr>
+          <p:cNvPr id="8" name="矩形 13">
+            <a:extLst>
+              <a:ext uri="{FF2B5EF4-FFF2-40B4-BE49-F238E27FC236}">
+                <a16:creationId xmlns:a16="http://schemas.microsoft.com/office/drawing/2014/main" id="{F8AE7A1B-D3AD-D84C-A239-3C6B5435B63C}"/>
+              </a:ext>
+            </a:extLst>
+          </p:cNvPr>
+          <p:cNvSpPr/>
+          <p:nvPr/>
+        </p:nvSpPr>
+        <p:spPr>
+          <a:xfrm>
+            <a:off x="3123857" y="4348710"/>
+            <a:ext cx="674639" cy="337015"/>
+          </a:xfrm>
+          <a:prstGeom prst="rect">
+            <a:avLst/>
+          </a:prstGeom>
+          <a:solidFill>
+            <a:schemeClr val="accent2">
+              <a:alpha val="0"/>
+            </a:schemeClr>
+          </a:solidFill>
+          <a:ln w="25400">
+            <a:solidFill>
+              <a:srgbClr val="FF0000"/>
+            </a:solidFill>
+            <a:prstDash val="sysDash"/>
+          </a:ln>
+        </p:spPr>
+        <p:style>
+          <a:lnRef idx="2">
+            <a:schemeClr val="accent1">
+              <a:shade val="50000"/>
+            </a:schemeClr>
+          </a:lnRef>
+          <a:fillRef idx="1">
+            <a:schemeClr val="accent1"/>
+          </a:fillRef>
+          <a:effectRef idx="0">
+            <a:schemeClr val="accent1"/>
+          </a:effectRef>
+          <a:fontRef idx="minor">
+            <a:schemeClr val="lt1"/>
+          </a:fontRef>
+        </p:style>
+        <p:txBody>
+          <a:bodyPr rtlCol="0" anchor="ctr"/>
+          <a:lstStyle/>
+          <a:p>
+            <a:pPr algn="ctr"/>
+            <a:endParaRPr lang="zh-CN" altLang="en-US"/>
+          </a:p>
+        </p:txBody>
+      </p:sp>
+      <p:sp>
+        <p:nvSpPr>
+          <p:cNvPr id="9" name="矩形 14">
+            <a:extLst>
+              <a:ext uri="{FF2B5EF4-FFF2-40B4-BE49-F238E27FC236}">
+                <a16:creationId xmlns:a16="http://schemas.microsoft.com/office/drawing/2014/main" id="{BA8EDCE8-B0B8-9445-9F1B-3FCAF5DF5006}"/>
+              </a:ext>
+            </a:extLst>
+          </p:cNvPr>
+          <p:cNvSpPr/>
+          <p:nvPr/>
+        </p:nvSpPr>
+        <p:spPr>
+          <a:xfrm>
+            <a:off x="3306475" y="1314502"/>
+            <a:ext cx="674639" cy="337015"/>
+          </a:xfrm>
+          <a:prstGeom prst="rect">
+            <a:avLst/>
+          </a:prstGeom>
+          <a:solidFill>
+            <a:schemeClr val="accent2">
+              <a:alpha val="0"/>
+            </a:schemeClr>
+          </a:solidFill>
+          <a:ln w="25400">
+            <a:solidFill>
+              <a:srgbClr val="FF0000"/>
+            </a:solidFill>
+            <a:prstDash val="sysDash"/>
+          </a:ln>
+        </p:spPr>
+        <p:style>
+          <a:lnRef idx="2">
+            <a:schemeClr val="accent1">
+              <a:shade val="50000"/>
+            </a:schemeClr>
+          </a:lnRef>
+          <a:fillRef idx="1">
+            <a:schemeClr val="accent1"/>
+          </a:fillRef>
+          <a:effectRef idx="0">
+            <a:schemeClr val="accent1"/>
+          </a:effectRef>
+          <a:fontRef idx="minor">
+            <a:schemeClr val="lt1"/>
+          </a:fontRef>
+        </p:style>
+        <p:txBody>
+          <a:bodyPr rtlCol="0" anchor="ctr"/>
+          <a:lstStyle/>
+          <a:p>
+            <a:pPr algn="ctr"/>
+            <a:endParaRPr lang="zh-CN" altLang="en-US"/>
+          </a:p>
+        </p:txBody>
+      </p:sp>
+      <p:sp>
+        <p:nvSpPr>
+          <p:cNvPr id="10" name="矩形 15">
+            <a:extLst>
+              <a:ext uri="{FF2B5EF4-FFF2-40B4-BE49-F238E27FC236}">
+                <a16:creationId xmlns:a16="http://schemas.microsoft.com/office/drawing/2014/main" id="{DBC944B8-B6A3-924E-8F9C-3C73754F9FD1}"/>
+              </a:ext>
+            </a:extLst>
+          </p:cNvPr>
+          <p:cNvSpPr/>
+          <p:nvPr/>
+        </p:nvSpPr>
+        <p:spPr>
+          <a:xfrm>
+            <a:off x="5277038" y="3764516"/>
+            <a:ext cx="472646" cy="393918"/>
+          </a:xfrm>
+          <a:prstGeom prst="rect">
+            <a:avLst/>
+          </a:prstGeom>
+          <a:solidFill>
+            <a:schemeClr val="accent2">
+              <a:alpha val="0"/>
+            </a:schemeClr>
+          </a:solidFill>
+          <a:ln w="25400">
+            <a:solidFill>
+              <a:srgbClr val="0070C0"/>
+            </a:solidFill>
+            <a:prstDash val="sysDash"/>
+          </a:ln>
+        </p:spPr>
+        <p:style>
+          <a:lnRef idx="2">
+            <a:schemeClr val="accent1">
+              <a:shade val="50000"/>
+            </a:schemeClr>
+          </a:lnRef>
+          <a:fillRef idx="1">
+            <a:schemeClr val="accent1"/>
+          </a:fillRef>
+          <a:effectRef idx="0">
+            <a:schemeClr val="accent1"/>
+          </a:effectRef>
+          <a:fontRef idx="minor">
+            <a:schemeClr val="lt1"/>
+          </a:fontRef>
+        </p:style>
+        <p:txBody>
+          <a:bodyPr rtlCol="0" anchor="ctr"/>
+          <a:lstStyle/>
+          <a:p>
+            <a:pPr algn="ctr"/>
+            <a:endParaRPr lang="zh-CN" altLang="en-US"/>
+          </a:p>
+        </p:txBody>
+      </p:sp>
+      <p:grpSp>
+        <p:nvGrpSpPr>
+          <p:cNvPr id="11" name="组合 4">
+            <a:extLst>
+              <a:ext uri="{FF2B5EF4-FFF2-40B4-BE49-F238E27FC236}">
+                <a16:creationId xmlns:a16="http://schemas.microsoft.com/office/drawing/2014/main" id="{BA4E6471-BFCC-F642-8B72-60475EA3EB44}"/>
+              </a:ext>
+            </a:extLst>
+          </p:cNvPr>
+          <p:cNvGrpSpPr/>
+          <p:nvPr/>
+        </p:nvGrpSpPr>
+        <p:grpSpPr>
+          <a:xfrm>
+            <a:off x="6078376" y="3091985"/>
+            <a:ext cx="1299206" cy="337015"/>
+            <a:chOff x="3809093" y="820905"/>
+            <a:chExt cx="1299206" cy="337015"/>
+          </a:xfrm>
+        </p:grpSpPr>
+        <p:sp>
+          <p:nvSpPr>
+            <p:cNvPr id="12" name="矩形 17">
+              <a:extLst>
+                <a:ext uri="{FF2B5EF4-FFF2-40B4-BE49-F238E27FC236}">
+                  <a16:creationId xmlns:a16="http://schemas.microsoft.com/office/drawing/2014/main" id="{EDAD1C8B-AF4A-344A-AD77-4927E626E2E7}"/>
+                </a:ext>
+              </a:extLst>
+            </p:cNvPr>
+            <p:cNvSpPr/>
+            <p:nvPr/>
+          </p:nvSpPr>
+          <p:spPr>
+            <a:xfrm>
+              <a:off x="3809093" y="929331"/>
+              <a:ext cx="360000" cy="180000"/>
+            </a:xfrm>
+            <a:prstGeom prst="rect">
+              <a:avLst/>
+            </a:prstGeom>
+            <a:solidFill>
+              <a:schemeClr val="accent2">
+                <a:alpha val="0"/>
+              </a:schemeClr>
+            </a:solidFill>
+            <a:ln w="25400">
+              <a:solidFill>
+                <a:srgbClr val="FF0000"/>
+              </a:solidFill>
+              <a:prstDash val="sysDash"/>
+            </a:ln>
+          </p:spPr>
+          <p:style>
+            <a:lnRef idx="2">
+              <a:schemeClr val="accent1">
+                <a:shade val="50000"/>
+              </a:schemeClr>
+            </a:lnRef>
+            <a:fillRef idx="1">
+              <a:schemeClr val="accent1"/>
+            </a:fillRef>
+            <a:effectRef idx="0">
+              <a:schemeClr val="accent1"/>
+            </a:effectRef>
+            <a:fontRef idx="minor">
+              <a:schemeClr val="lt1"/>
+            </a:fontRef>
+          </p:style>
+          <p:txBody>
+            <a:bodyPr rtlCol="0" anchor="ctr"/>
+            <a:lstStyle/>
+            <a:p>
+              <a:pPr algn="ctr"/>
+              <a:endParaRPr lang="zh-CN" altLang="en-US" dirty="0"/>
+            </a:p>
+          </p:txBody>
+        </p:sp>
+        <p:sp>
+          <p:nvSpPr>
+            <p:cNvPr id="13" name="文本框 19">
+              <a:extLst>
+                <a:ext uri="{FF2B5EF4-FFF2-40B4-BE49-F238E27FC236}">
+                  <a16:creationId xmlns:a16="http://schemas.microsoft.com/office/drawing/2014/main" id="{AC45A933-5067-3748-BA8B-D15CE73DBA7D}"/>
+                </a:ext>
+              </a:extLst>
+            </p:cNvPr>
+            <p:cNvSpPr txBox="1"/>
+            <p:nvPr/>
+          </p:nvSpPr>
+          <p:spPr>
+            <a:xfrm>
+              <a:off x="4169093" y="820905"/>
+              <a:ext cx="939206" cy="337015"/>
+            </a:xfrm>
+            <a:prstGeom prst="rect">
+              <a:avLst/>
+            </a:prstGeom>
+            <a:noFill/>
+          </p:spPr>
+          <p:txBody>
+            <a:bodyPr wrap="square">
+              <a:spAutoFit/>
+            </a:bodyPr>
+            <a:lstStyle/>
+            <a:p>
+              <a:pPr>
+                <a:lnSpc>
+                  <a:spcPct val="125000"/>
+                </a:lnSpc>
+              </a:pPr>
+              <a:r>
+                <a:rPr lang="zh-CN" altLang="en-US" sz="1400" kern="100" dirty="0">
+                  <a:effectLst/>
+                  <a:latin typeface="微软雅黑" panose="020B0503020204020204" pitchFamily="34" charset="-122"/>
+                  <a:ea typeface="微软雅黑" panose="020B0503020204020204" pitchFamily="34" charset="-122"/>
+                </a:rPr>
+                <a:t>定位基站</a:t>
+              </a:r>
+              <a:endParaRPr lang="zh-CN" altLang="zh-CN" sz="1400" kern="100" dirty="0">
+                <a:effectLst/>
+                <a:latin typeface="微软雅黑" panose="020B0503020204020204" pitchFamily="34" charset="-122"/>
+                <a:ea typeface="微软雅黑" panose="020B0503020204020204" pitchFamily="34" charset="-122"/>
+              </a:endParaRPr>
+            </a:p>
+          </p:txBody>
+        </p:sp>
+      </p:grpSp>
+      <p:grpSp>
+        <p:nvGrpSpPr>
+          <p:cNvPr id="14" name="组合 6">
+            <a:extLst>
+              <a:ext uri="{FF2B5EF4-FFF2-40B4-BE49-F238E27FC236}">
+                <a16:creationId xmlns:a16="http://schemas.microsoft.com/office/drawing/2014/main" id="{3D06D8F5-A955-3D4B-AB00-F28ED2C4AFF8}"/>
+              </a:ext>
+            </a:extLst>
+          </p:cNvPr>
+          <p:cNvGrpSpPr/>
+          <p:nvPr/>
+        </p:nvGrpSpPr>
+        <p:grpSpPr>
+          <a:xfrm>
+            <a:off x="6071739" y="2302091"/>
+            <a:ext cx="1444081" cy="337015"/>
+            <a:chOff x="5212761" y="826635"/>
+            <a:chExt cx="1444081" cy="337015"/>
+          </a:xfrm>
+        </p:grpSpPr>
+        <p:sp>
+          <p:nvSpPr>
+            <p:cNvPr id="15" name="矩形 20">
+              <a:extLst>
+                <a:ext uri="{FF2B5EF4-FFF2-40B4-BE49-F238E27FC236}">
+                  <a16:creationId xmlns:a16="http://schemas.microsoft.com/office/drawing/2014/main" id="{03106647-8C4B-2A4F-B7B1-A63EB92171B5}"/>
+                </a:ext>
+              </a:extLst>
+            </p:cNvPr>
+            <p:cNvSpPr/>
+            <p:nvPr/>
+          </p:nvSpPr>
+          <p:spPr>
+            <a:xfrm>
+              <a:off x="5212761" y="920652"/>
+              <a:ext cx="360000" cy="180000"/>
+            </a:xfrm>
+            <a:prstGeom prst="rect">
+              <a:avLst/>
+            </a:prstGeom>
+            <a:solidFill>
+              <a:schemeClr val="accent2">
+                <a:alpha val="0"/>
+              </a:schemeClr>
+            </a:solidFill>
+            <a:ln w="25400">
+              <a:solidFill>
+                <a:srgbClr val="0070C0"/>
+              </a:solidFill>
+              <a:prstDash val="sysDash"/>
+            </a:ln>
+          </p:spPr>
+          <p:style>
+            <a:lnRef idx="2">
+              <a:schemeClr val="accent1">
+                <a:shade val="50000"/>
+              </a:schemeClr>
+            </a:lnRef>
+            <a:fillRef idx="1">
+              <a:schemeClr val="accent1"/>
+            </a:fillRef>
+            <a:effectRef idx="0">
+              <a:schemeClr val="accent1"/>
+            </a:effectRef>
+            <a:fontRef idx="minor">
+              <a:schemeClr val="lt1"/>
+            </a:fontRef>
+          </p:style>
+          <p:txBody>
+            <a:bodyPr rtlCol="0" anchor="ctr"/>
+            <a:lstStyle/>
+            <a:p>
+              <a:pPr algn="ctr"/>
+              <a:endParaRPr lang="zh-CN" altLang="en-US"/>
+            </a:p>
+          </p:txBody>
+        </p:sp>
+        <p:sp>
+          <p:nvSpPr>
+            <p:cNvPr id="16" name="文本框 21">
+              <a:extLst>
+                <a:ext uri="{FF2B5EF4-FFF2-40B4-BE49-F238E27FC236}">
+                  <a16:creationId xmlns:a16="http://schemas.microsoft.com/office/drawing/2014/main" id="{050CC5F9-97C8-4D43-8A46-7E08091F9401}"/>
+                </a:ext>
+              </a:extLst>
+            </p:cNvPr>
+            <p:cNvSpPr txBox="1"/>
+            <p:nvPr/>
+          </p:nvSpPr>
+          <p:spPr>
+            <a:xfrm>
+              <a:off x="5579398" y="826635"/>
+              <a:ext cx="1077444" cy="337015"/>
+            </a:xfrm>
+            <a:prstGeom prst="rect">
+              <a:avLst/>
+            </a:prstGeom>
+            <a:noFill/>
+          </p:spPr>
+          <p:txBody>
+            <a:bodyPr wrap="square">
+              <a:spAutoFit/>
+            </a:bodyPr>
+            <a:lstStyle/>
+            <a:p>
+              <a:pPr>
+                <a:lnSpc>
+                  <a:spcPct val="125000"/>
+                </a:lnSpc>
+              </a:pPr>
+              <a:r>
+                <a:rPr lang="zh-CN" altLang="en-US" sz="1400" kern="100" dirty="0">
+                  <a:latin typeface="微软雅黑" panose="020B0503020204020204" pitchFamily="34" charset="-122"/>
+                  <a:ea typeface="微软雅黑" panose="020B0503020204020204" pitchFamily="34" charset="-122"/>
+                </a:rPr>
+                <a:t>待定位节</a:t>
+              </a:r>
+              <a:r>
+                <a:rPr lang="zh-CN" altLang="en-US" sz="1400" kern="100" dirty="0">
+                  <a:effectLst/>
+                  <a:latin typeface="微软雅黑" panose="020B0503020204020204" pitchFamily="34" charset="-122"/>
+                  <a:ea typeface="微软雅黑" panose="020B0503020204020204" pitchFamily="34" charset="-122"/>
+                </a:rPr>
+                <a:t>点</a:t>
+              </a:r>
+              <a:endParaRPr lang="zh-CN" altLang="zh-CN" sz="1400" kern="100" dirty="0">
+                <a:effectLst/>
+                <a:latin typeface="微软雅黑" panose="020B0503020204020204" pitchFamily="34" charset="-122"/>
+                <a:ea typeface="微软雅黑" panose="020B0503020204020204" pitchFamily="34" charset="-122"/>
+              </a:endParaRPr>
+            </a:p>
+          </p:txBody>
+        </p:sp>
+      </p:grpSp>
+      <p:grpSp>
+        <p:nvGrpSpPr>
+          <p:cNvPr id="17" name="组合 23">
+            <a:extLst>
+              <a:ext uri="{FF2B5EF4-FFF2-40B4-BE49-F238E27FC236}">
+                <a16:creationId xmlns:a16="http://schemas.microsoft.com/office/drawing/2014/main" id="{B332F38D-F886-374E-8C4A-9D6D849D0057}"/>
+              </a:ext>
+            </a:extLst>
+          </p:cNvPr>
+          <p:cNvGrpSpPr/>
+          <p:nvPr/>
+        </p:nvGrpSpPr>
+        <p:grpSpPr>
+          <a:xfrm>
+            <a:off x="6071738" y="1578434"/>
+            <a:ext cx="1671830" cy="337015"/>
+            <a:chOff x="7073332" y="810619"/>
+            <a:chExt cx="1671830" cy="337015"/>
+          </a:xfrm>
+        </p:grpSpPr>
+        <p:cxnSp>
+          <p:nvCxnSpPr>
+            <p:cNvPr id="18" name="直接连接符 22">
+              <a:extLst>
+                <a:ext uri="{FF2B5EF4-FFF2-40B4-BE49-F238E27FC236}">
+                  <a16:creationId xmlns:a16="http://schemas.microsoft.com/office/drawing/2014/main" id="{6D84A11A-1E1A-0549-8A09-7B88726ADFE3}"/>
+                </a:ext>
+              </a:extLst>
+            </p:cNvPr>
+            <p:cNvCxnSpPr>
+              <a:cxnSpLocks/>
+            </p:cNvCxnSpPr>
+            <p:nvPr/>
+          </p:nvCxnSpPr>
+          <p:spPr>
+            <a:xfrm>
+              <a:off x="7073332" y="996006"/>
+              <a:ext cx="360000" cy="0"/>
+            </a:xfrm>
+            <a:prstGeom prst="line">
+              <a:avLst/>
+            </a:prstGeom>
+            <a:ln w="28575">
+              <a:solidFill>
+                <a:srgbClr val="00B150"/>
+              </a:solidFill>
+              <a:prstDash val="dash"/>
+              <a:headEnd type="none" w="med" len="med"/>
+              <a:tailEnd type="none" w="med" len="med"/>
+            </a:ln>
+          </p:spPr>
+          <p:style>
+            <a:lnRef idx="1">
+              <a:schemeClr val="dk1"/>
+            </a:lnRef>
+            <a:fillRef idx="0">
+              <a:schemeClr val="dk1"/>
+            </a:fillRef>
+            <a:effectRef idx="0">
+              <a:schemeClr val="dk1"/>
+            </a:effectRef>
+            <a:fontRef idx="minor">
+              <a:schemeClr val="tx1"/>
+            </a:fontRef>
+          </p:style>
+        </p:cxnSp>
+        <p:sp>
+          <p:nvSpPr>
+            <p:cNvPr id="19" name="文本框 25">
+              <a:extLst>
+                <a:ext uri="{FF2B5EF4-FFF2-40B4-BE49-F238E27FC236}">
+                  <a16:creationId xmlns:a16="http://schemas.microsoft.com/office/drawing/2014/main" id="{9ADE2662-B2C3-264F-9812-4BA11A4E8A48}"/>
+                </a:ext>
+              </a:extLst>
+            </p:cNvPr>
+            <p:cNvSpPr txBox="1"/>
+            <p:nvPr/>
+          </p:nvSpPr>
+          <p:spPr>
+            <a:xfrm>
+              <a:off x="7433332" y="810619"/>
+              <a:ext cx="1311830" cy="337015"/>
+            </a:xfrm>
+            <a:prstGeom prst="rect">
+              <a:avLst/>
+            </a:prstGeom>
+            <a:noFill/>
+          </p:spPr>
+          <p:txBody>
+            <a:bodyPr wrap="square">
+              <a:spAutoFit/>
+            </a:bodyPr>
+            <a:lstStyle/>
+            <a:p>
+              <a:pPr>
+                <a:lnSpc>
+                  <a:spcPct val="125000"/>
+                </a:lnSpc>
+              </a:pPr>
+              <a:r>
+                <a:rPr lang="zh-CN" altLang="en-US" sz="1400" kern="100" dirty="0">
+                  <a:latin typeface="微软雅黑" panose="020B0503020204020204" pitchFamily="34" charset="-122"/>
+                  <a:ea typeface="微软雅黑" panose="020B0503020204020204" pitchFamily="34" charset="-122"/>
+                </a:rPr>
+                <a:t>超宽频可测距</a:t>
+              </a:r>
+              <a:endParaRPr lang="zh-CN" altLang="zh-CN" sz="1400" kern="100" dirty="0">
+                <a:effectLst/>
+                <a:latin typeface="微软雅黑" panose="020B0503020204020204" pitchFamily="34" charset="-122"/>
+                <a:ea typeface="微软雅黑" panose="020B0503020204020204" pitchFamily="34" charset="-122"/>
+              </a:endParaRPr>
+            </a:p>
+          </p:txBody>
+        </p:sp>
+      </p:grpSp>
+      <p:pic>
+        <p:nvPicPr>
+          <p:cNvPr id="21" name="Picture 20">
+            <a:extLst>
+              <a:ext uri="{FF2B5EF4-FFF2-40B4-BE49-F238E27FC236}">
+                <a16:creationId xmlns:a16="http://schemas.microsoft.com/office/drawing/2014/main" id="{A1274840-B7CE-1B40-9C8D-61973D646052}"/>
+              </a:ext>
+            </a:extLst>
+          </p:cNvPr>
+          <p:cNvPicPr>
+            <a:picLocks noChangeAspect="1"/>
+          </p:cNvPicPr>
+          <p:nvPr/>
+        </p:nvPicPr>
+        <p:blipFill rotWithShape="1">
+          <a:blip r:embed="rId3"/>
+          <a:srcRect l="36214"/>
+          <a:stretch/>
+        </p:blipFill>
+        <p:spPr>
+          <a:xfrm>
+            <a:off x="2370012" y="3356230"/>
+            <a:ext cx="308645" cy="641134"/>
+          </a:xfrm>
+          <a:prstGeom prst="rect">
+            <a:avLst/>
+          </a:prstGeom>
+        </p:spPr>
+      </p:pic>
+      <p:pic>
+        <p:nvPicPr>
+          <p:cNvPr id="22" name="Picture 21">
+            <a:extLst>
+              <a:ext uri="{FF2B5EF4-FFF2-40B4-BE49-F238E27FC236}">
+                <a16:creationId xmlns:a16="http://schemas.microsoft.com/office/drawing/2014/main" id="{E44EF5E3-4544-F14B-9064-451B14594452}"/>
+              </a:ext>
+            </a:extLst>
+          </p:cNvPr>
+          <p:cNvPicPr>
+            <a:picLocks noChangeAspect="1"/>
+          </p:cNvPicPr>
+          <p:nvPr/>
+        </p:nvPicPr>
+        <p:blipFill>
+          <a:blip r:embed="rId4"/>
+          <a:stretch>
+            <a:fillRect/>
+          </a:stretch>
+        </p:blipFill>
+        <p:spPr>
+          <a:xfrm>
+            <a:off x="3892551" y="3416396"/>
+            <a:ext cx="279545" cy="649099"/>
+          </a:xfrm>
+          <a:prstGeom prst="rect">
+            <a:avLst/>
+          </a:prstGeom>
+        </p:spPr>
+      </p:pic>
+      <p:sp>
+        <p:nvSpPr>
+          <p:cNvPr id="5" name="矩形 10">
+            <a:extLst>
+              <a:ext uri="{FF2B5EF4-FFF2-40B4-BE49-F238E27FC236}">
+                <a16:creationId xmlns:a16="http://schemas.microsoft.com/office/drawing/2014/main" id="{CF0644BE-BE1E-F94D-8F3E-D4E2CD530166}"/>
+              </a:ext>
+            </a:extLst>
+          </p:cNvPr>
+          <p:cNvSpPr/>
+          <p:nvPr/>
+        </p:nvSpPr>
+        <p:spPr>
+          <a:xfrm>
+            <a:off x="3798498" y="3390587"/>
+            <a:ext cx="477036" cy="691718"/>
+          </a:xfrm>
+          <a:prstGeom prst="rect">
+            <a:avLst/>
+          </a:prstGeom>
+          <a:solidFill>
+            <a:schemeClr val="accent2">
+              <a:alpha val="0"/>
+            </a:schemeClr>
+          </a:solidFill>
+          <a:ln w="25400">
+            <a:solidFill>
+              <a:srgbClr val="0070C0"/>
+            </a:solidFill>
+            <a:prstDash val="sysDash"/>
+          </a:ln>
+        </p:spPr>
+        <p:style>
+          <a:lnRef idx="2">
+            <a:schemeClr val="accent1">
+              <a:shade val="50000"/>
+            </a:schemeClr>
+          </a:lnRef>
+          <a:fillRef idx="1">
+            <a:schemeClr val="accent1"/>
+          </a:fillRef>
+          <a:effectRef idx="0">
+            <a:schemeClr val="accent1"/>
+          </a:effectRef>
+          <a:fontRef idx="minor">
+            <a:schemeClr val="lt1"/>
+          </a:fontRef>
+        </p:style>
+        <p:txBody>
+          <a:bodyPr rtlCol="0" anchor="ctr"/>
+          <a:lstStyle/>
+          <a:p>
+            <a:pPr algn="ctr"/>
+            <a:endParaRPr lang="zh-CN" altLang="en-US"/>
+          </a:p>
+        </p:txBody>
+      </p:sp>
+    </p:spTree>
+    <p:extLst>
+      <p:ext uri="{BB962C8B-B14F-4D97-AF65-F5344CB8AC3E}">
+        <p14:creationId xmlns:p14="http://schemas.microsoft.com/office/powerpoint/2010/main" val="2576409100"/>
+      </p:ext>
+    </p:extLst>
+  </p:cSld>
+  <p:clrMapOvr>
+    <a:masterClrMapping/>
+  </p:clrMapOvr>
+  <p:timing>
+    <p:tnLst>
+      <p:par>
+        <p:cTn id="1" dur="indefinite" restart="never" nodeType="tmRoot">
+          <p:childTnLst>
+            <p:seq concurrent="1" nextAc="seek">
+              <p:cTn id="2" dur="indefinite" nodeType="mainSeq">
+                <p:childTnLst>
+                  <p:par>
+                    <p:cTn id="3" fill="hold">
+                      <p:stCondLst>
+                        <p:cond delay="indefinite"/>
+                      </p:stCondLst>
+                      <p:childTnLst>
+                        <p:par>
+                          <p:cTn id="4" fill="hold">
+                            <p:stCondLst>
+                              <p:cond delay="0"/>
+                            </p:stCondLst>
+                            <p:childTnLst>
+                              <p:par>
+                                <p:cTn id="5" presetID="14" presetClass="entr" presetSubtype="10" fill="hold" grpId="0" nodeType="clickEffect">
+                                  <p:stCondLst>
+                                    <p:cond delay="0"/>
+                                  </p:stCondLst>
+                                  <p:childTnLst>
+                                    <p:set>
+                                      <p:cBhvr>
+                                        <p:cTn id="6" dur="1" fill="hold">
+                                          <p:stCondLst>
+                                            <p:cond delay="0"/>
+                                          </p:stCondLst>
+                                        </p:cTn>
+                                        <p:tgtEl>
+                                          <p:spTgt spid="7"/>
+                                        </p:tgtEl>
+                                        <p:attrNameLst>
+                                          <p:attrName>style.visibility</p:attrName>
+                                        </p:attrNameLst>
+                                      </p:cBhvr>
+                                      <p:to>
+                                        <p:strVal val="visible"/>
+                                      </p:to>
+                                    </p:set>
+                                    <p:animEffect transition="in" filter="randombar(horizontal)">
+                                      <p:cBhvr>
+                                        <p:cTn id="7" dur="500"/>
+                                        <p:tgtEl>
+                                          <p:spTgt spid="7"/>
+                                        </p:tgtEl>
+                                      </p:cBhvr>
+                                    </p:animEffect>
+                                  </p:childTnLst>
+                                </p:cTn>
+                              </p:par>
+                              <p:par>
+                                <p:cTn id="8" presetID="14" presetClass="entr" presetSubtype="10" fill="hold" grpId="0" nodeType="withEffect">
+                                  <p:stCondLst>
+                                    <p:cond delay="0"/>
+                                  </p:stCondLst>
+                                  <p:childTnLst>
+                                    <p:set>
+                                      <p:cBhvr>
+                                        <p:cTn id="9" dur="1" fill="hold">
+                                          <p:stCondLst>
+                                            <p:cond delay="0"/>
+                                          </p:stCondLst>
+                                        </p:cTn>
+                                        <p:tgtEl>
+                                          <p:spTgt spid="3"/>
+                                        </p:tgtEl>
+                                        <p:attrNameLst>
+                                          <p:attrName>style.visibility</p:attrName>
+                                        </p:attrNameLst>
+                                      </p:cBhvr>
+                                      <p:to>
+                                        <p:strVal val="visible"/>
+                                      </p:to>
+                                    </p:set>
+                                    <p:animEffect transition="in" filter="randombar(horizontal)">
+                                      <p:cBhvr>
+                                        <p:cTn id="10" dur="500"/>
+                                        <p:tgtEl>
+                                          <p:spTgt spid="3"/>
+                                        </p:tgtEl>
+                                      </p:cBhvr>
+                                    </p:animEffect>
+                                  </p:childTnLst>
+                                </p:cTn>
+                              </p:par>
+                              <p:par>
+                                <p:cTn id="11" presetID="14" presetClass="entr" presetSubtype="10" fill="hold" grpId="0" nodeType="withEffect">
+                                  <p:stCondLst>
+                                    <p:cond delay="0"/>
+                                  </p:stCondLst>
+                                  <p:childTnLst>
+                                    <p:set>
+                                      <p:cBhvr>
+                                        <p:cTn id="12" dur="1" fill="hold">
+                                          <p:stCondLst>
+                                            <p:cond delay="0"/>
+                                          </p:stCondLst>
+                                        </p:cTn>
+                                        <p:tgtEl>
+                                          <p:spTgt spid="9"/>
+                                        </p:tgtEl>
+                                        <p:attrNameLst>
+                                          <p:attrName>style.visibility</p:attrName>
+                                        </p:attrNameLst>
+                                      </p:cBhvr>
+                                      <p:to>
+                                        <p:strVal val="visible"/>
+                                      </p:to>
+                                    </p:set>
+                                    <p:animEffect transition="in" filter="randombar(horizontal)">
+                                      <p:cBhvr>
+                                        <p:cTn id="13" dur="500"/>
+                                        <p:tgtEl>
+                                          <p:spTgt spid="9"/>
+                                        </p:tgtEl>
+                                      </p:cBhvr>
+                                    </p:animEffect>
+                                  </p:childTnLst>
+                                </p:cTn>
+                              </p:par>
+                              <p:par>
+                                <p:cTn id="14" presetID="14" presetClass="entr" presetSubtype="10" fill="hold" grpId="0" nodeType="withEffect">
+                                  <p:stCondLst>
+                                    <p:cond delay="0"/>
+                                  </p:stCondLst>
+                                  <p:childTnLst>
+                                    <p:set>
+                                      <p:cBhvr>
+                                        <p:cTn id="15" dur="1" fill="hold">
+                                          <p:stCondLst>
+                                            <p:cond delay="0"/>
+                                          </p:stCondLst>
+                                        </p:cTn>
+                                        <p:tgtEl>
+                                          <p:spTgt spid="6"/>
+                                        </p:tgtEl>
+                                        <p:attrNameLst>
+                                          <p:attrName>style.visibility</p:attrName>
+                                        </p:attrNameLst>
+                                      </p:cBhvr>
+                                      <p:to>
+                                        <p:strVal val="visible"/>
+                                      </p:to>
+                                    </p:set>
+                                    <p:animEffect transition="in" filter="randombar(horizontal)">
+                                      <p:cBhvr>
+                                        <p:cTn id="16" dur="500"/>
+                                        <p:tgtEl>
+                                          <p:spTgt spid="6"/>
+                                        </p:tgtEl>
+                                      </p:cBhvr>
+                                    </p:animEffect>
+                                  </p:childTnLst>
+                                </p:cTn>
+                              </p:par>
+                              <p:par>
+                                <p:cTn id="17" presetID="14" presetClass="entr" presetSubtype="10" fill="hold" grpId="0" nodeType="withEffect">
+                                  <p:stCondLst>
+                                    <p:cond delay="0"/>
+                                  </p:stCondLst>
+                                  <p:childTnLst>
+                                    <p:set>
+                                      <p:cBhvr>
+                                        <p:cTn id="18" dur="1" fill="hold">
+                                          <p:stCondLst>
+                                            <p:cond delay="0"/>
+                                          </p:stCondLst>
+                                        </p:cTn>
+                                        <p:tgtEl>
+                                          <p:spTgt spid="8"/>
+                                        </p:tgtEl>
+                                        <p:attrNameLst>
+                                          <p:attrName>style.visibility</p:attrName>
+                                        </p:attrNameLst>
+                                      </p:cBhvr>
+                                      <p:to>
+                                        <p:strVal val="visible"/>
+                                      </p:to>
+                                    </p:set>
+                                    <p:animEffect transition="in" filter="randombar(horizontal)">
+                                      <p:cBhvr>
+                                        <p:cTn id="19" dur="500"/>
+                                        <p:tgtEl>
+                                          <p:spTgt spid="8"/>
+                                        </p:tgtEl>
+                                      </p:cBhvr>
+                                    </p:animEffect>
+                                  </p:childTnLst>
+                                </p:cTn>
+                              </p:par>
+                              <p:par>
+                                <p:cTn id="20" presetID="14" presetClass="entr" presetSubtype="10" fill="hold" grpId="0" nodeType="withEffect">
+                                  <p:stCondLst>
+                                    <p:cond delay="0"/>
+                                  </p:stCondLst>
+                                  <p:childTnLst>
+                                    <p:set>
+                                      <p:cBhvr>
+                                        <p:cTn id="21" dur="1" fill="hold">
+                                          <p:stCondLst>
+                                            <p:cond delay="0"/>
+                                          </p:stCondLst>
+                                        </p:cTn>
+                                        <p:tgtEl>
+                                          <p:spTgt spid="4"/>
+                                        </p:tgtEl>
+                                        <p:attrNameLst>
+                                          <p:attrName>style.visibility</p:attrName>
+                                        </p:attrNameLst>
+                                      </p:cBhvr>
+                                      <p:to>
+                                        <p:strVal val="visible"/>
+                                      </p:to>
+                                    </p:set>
+                                    <p:animEffect transition="in" filter="randombar(horizontal)">
+                                      <p:cBhvr>
+                                        <p:cTn id="22" dur="500"/>
+                                        <p:tgtEl>
+                                          <p:spTgt spid="4"/>
+                                        </p:tgtEl>
+                                      </p:cBhvr>
+                                    </p:animEffect>
+                                  </p:childTnLst>
+                                </p:cTn>
+                              </p:par>
+                              <p:par>
+                                <p:cTn id="23" presetID="14" presetClass="entr" presetSubtype="10" fill="hold" grpId="0" nodeType="withEffect">
+                                  <p:stCondLst>
+                                    <p:cond delay="0"/>
+                                  </p:stCondLst>
+                                  <p:childTnLst>
+                                    <p:set>
+                                      <p:cBhvr>
+                                        <p:cTn id="24" dur="1" fill="hold">
+                                          <p:stCondLst>
+                                            <p:cond delay="0"/>
+                                          </p:stCondLst>
+                                        </p:cTn>
+                                        <p:tgtEl>
+                                          <p:spTgt spid="5"/>
+                                        </p:tgtEl>
+                                        <p:attrNameLst>
+                                          <p:attrName>style.visibility</p:attrName>
+                                        </p:attrNameLst>
+                                      </p:cBhvr>
+                                      <p:to>
+                                        <p:strVal val="visible"/>
+                                      </p:to>
+                                    </p:set>
+                                    <p:animEffect transition="in" filter="randombar(horizontal)">
+                                      <p:cBhvr>
+                                        <p:cTn id="25" dur="500"/>
+                                        <p:tgtEl>
+                                          <p:spTgt spid="5"/>
+                                        </p:tgtEl>
+                                      </p:cBhvr>
+                                    </p:animEffect>
+                                  </p:childTnLst>
+                                </p:cTn>
+                              </p:par>
+                              <p:par>
+                                <p:cTn id="26" presetID="14" presetClass="entr" presetSubtype="10" fill="hold" grpId="0" nodeType="withEffect">
+                                  <p:stCondLst>
+                                    <p:cond delay="0"/>
+                                  </p:stCondLst>
+                                  <p:childTnLst>
+                                    <p:set>
+                                      <p:cBhvr>
+                                        <p:cTn id="27" dur="1" fill="hold">
+                                          <p:stCondLst>
+                                            <p:cond delay="0"/>
+                                          </p:stCondLst>
+                                        </p:cTn>
+                                        <p:tgtEl>
+                                          <p:spTgt spid="10"/>
+                                        </p:tgtEl>
+                                        <p:attrNameLst>
+                                          <p:attrName>style.visibility</p:attrName>
+                                        </p:attrNameLst>
+                                      </p:cBhvr>
+                                      <p:to>
+                                        <p:strVal val="visible"/>
+                                      </p:to>
+                                    </p:set>
+                                    <p:animEffect transition="in" filter="randombar(horizontal)">
+                                      <p:cBhvr>
+                                        <p:cTn id="28" dur="500"/>
+                                        <p:tgtEl>
+                                          <p:spTgt spid="10"/>
+                                        </p:tgtEl>
+                                      </p:cBhvr>
+                                    </p:animEffect>
+                                  </p:childTnLst>
+                                </p:cTn>
+                              </p:par>
+                            </p:childTnLst>
+                          </p:cTn>
+                        </p:par>
+                      </p:childTnLst>
+                    </p:cTn>
+                  </p:par>
+                </p:childTnLst>
+              </p:cTn>
+              <p:prevCondLst>
+                <p:cond evt="onPrev" delay="0">
+                  <p:tgtEl>
+                    <p:sldTgt/>
+                  </p:tgtEl>
+                </p:cond>
+              </p:prevCondLst>
+              <p:nextCondLst>
+                <p:cond evt="onNext" delay="0">
+                  <p:tgtEl>
+                    <p:sldTgt/>
+                  </p:tgtEl>
+                </p:cond>
+              </p:nextCondLst>
+            </p:seq>
+          </p:childTnLst>
+        </p:cTn>
+      </p:par>
+    </p:tnLst>
+    <p:bldLst>
+      <p:bldP spid="3" grpId="0" animBg="1"/>
+      <p:bldP spid="4" grpId="0" animBg="1"/>
+      <p:bldP spid="6" grpId="0" animBg="1"/>
+      <p:bldP spid="7" grpId="0" animBg="1"/>
+      <p:bldP spid="8" grpId="0" animBg="1"/>
+      <p:bldP spid="9" grpId="0" animBg="1"/>
+      <p:bldP spid="10" grpId="0" animBg="1"/>
+      <p:bldP spid="5" grpId="0" animBg="1"/>
+    </p:bldLst>
+  </p:timing>
+</p:sld>
+</file>
+
 <file path=ppt/theme/theme1.xml><?xml version="1.0" encoding="utf-8"?>
 <a:theme xmlns:a="http://schemas.openxmlformats.org/drawingml/2006/main" name="Office Theme">
   <a:themeElements>

</xml_diff>